<commit_message>
update hướng dẫn cài đặt
</commit_message>
<xml_diff>
--- a/huong_dan_cai_dat/Huong dan cai dat.pptx
+++ b/huong_dan_cai_dat/Huong dan cai dat.pptx
@@ -110,6 +110,11 @@
       </a:defRPr>
     </a:lvl9pPr>
   </p:defaultTextStyle>
+  <p:extLst>
+    <p:ext uri="{EFAFB233-063F-42B5-8137-9DF3F51BA10A}">
+      <p15:sldGuideLst xmlns:p15="http://schemas.microsoft.com/office/powerpoint/2012/main"/>
+    </p:ext>
+  </p:extLst>
 </p:presentation>
 </file>
 
@@ -4799,6 +4804,88 @@
           </a:effectLst>
         </p:spPr>
       </p:pic>
+      <p:sp>
+        <p:nvSpPr>
+          <p:cNvPr id="5" name="TextBox 4">
+            <a:extLst>
+              <a:ext uri="{FF2B5EF4-FFF2-40B4-BE49-F238E27FC236}">
+                <a16:creationId xmlns:a16="http://schemas.microsoft.com/office/drawing/2014/main" id="{47E16091-EB9F-E364-BFD4-90C4E2F34DF1}"/>
+              </a:ext>
+            </a:extLst>
+          </p:cNvPr>
+          <p:cNvSpPr txBox="1"/>
+          <p:nvPr/>
+        </p:nvSpPr>
+        <p:spPr>
+          <a:xfrm>
+            <a:off x="1497105" y="5118875"/>
+            <a:ext cx="3092824" cy="646331"/>
+          </a:xfrm>
+          <a:prstGeom prst="rect">
+            <a:avLst/>
+          </a:prstGeom>
+          <a:noFill/>
+        </p:spPr>
+        <p:txBody>
+          <a:bodyPr wrap="square">
+            <a:spAutoFit/>
+          </a:bodyPr>
+          <a:lstStyle/>
+          <a:p>
+            <a:r>
+              <a:rPr lang="en-US">
+                <a:hlinkClick r:id="rId5"/>
+              </a:rPr>
+              <a:t>https://cursor.com/download</a:t>
+            </a:r>
+            <a:endParaRPr lang="en-US"/>
+          </a:p>
+          <a:p>
+            <a:endParaRPr lang="en-US"/>
+          </a:p>
+        </p:txBody>
+      </p:sp>
+      <p:sp>
+        <p:nvSpPr>
+          <p:cNvPr id="7" name="TextBox 6">
+            <a:extLst>
+              <a:ext uri="{FF2B5EF4-FFF2-40B4-BE49-F238E27FC236}">
+                <a16:creationId xmlns:a16="http://schemas.microsoft.com/office/drawing/2014/main" id="{BBD4D2A1-664F-A8AB-1ACE-9714EAB38FB7}"/>
+              </a:ext>
+            </a:extLst>
+          </p:cNvPr>
+          <p:cNvSpPr txBox="1"/>
+          <p:nvPr/>
+        </p:nvSpPr>
+        <p:spPr>
+          <a:xfrm>
+            <a:off x="7150668" y="5118874"/>
+            <a:ext cx="4007224" cy="646331"/>
+          </a:xfrm>
+          <a:prstGeom prst="rect">
+            <a:avLst/>
+          </a:prstGeom>
+          <a:noFill/>
+        </p:spPr>
+        <p:txBody>
+          <a:bodyPr wrap="square">
+            <a:spAutoFit/>
+          </a:bodyPr>
+          <a:lstStyle/>
+          <a:p>
+            <a:r>
+              <a:rPr lang="en-US">
+                <a:hlinkClick r:id="rId6"/>
+              </a:rPr>
+              <a:t>https://www.anaconda.com/download</a:t>
+            </a:r>
+            <a:endParaRPr lang="en-US"/>
+          </a:p>
+          <a:p>
+            <a:endParaRPr lang="en-US"/>
+          </a:p>
+        </p:txBody>
+      </p:sp>
     </p:spTree>
   </p:cSld>
   <p:clrMapOvr>

</xml_diff>